<commit_message>
uploaded PowerPoint file of NJ Qualifier Entry
</commit_message>
<xml_diff>
--- a/7350 nj qualifier entry.pptx
+++ b/7350 nj qualifier entry.pptx
@@ -7789,7 +7789,7 @@
         <p:spPr>
           <a:xfrm>
             <a:off x="673374" y="789325"/>
-            <a:ext cx="5334000" cy="3477875"/>
+            <a:ext cx="5334000" cy="2800767"/>
           </a:xfrm>
           <a:prstGeom prst="rect">
             <a:avLst/>
@@ -7813,7 +7813,27 @@
             </a:r>
             <a:r>
               <a:rPr lang="en-US" sz="2200" dirty="0" smtClean="0"/>
-              <a:t>, 2015, our team competed in a New Jersey Qualifier at Liberty Science Center. We used our newly made robot that included a  carbon-fiber chasse, a not fully operational swerve-drive, and scissor lift that also was not entirely operational. We did emerge successful though, at the end of the Qualifier, due to strategic driving in tele-op and moving rolling goals onto our alliance's ramp. </a:t>
+              <a:t>, 2015, our team competed in a New Jersey Qualifier at Liberty Science Center. We used our newly made robot that included a  carbon-fiber chasse, </a:t>
+            </a:r>
+            <a:r>
+              <a:rPr lang="en-US" sz="2200" dirty="0" smtClean="0"/>
+              <a:t>a </a:t>
+            </a:r>
+            <a:r>
+              <a:rPr lang="en-US" sz="2200" dirty="0" smtClean="0"/>
+              <a:t>swerve-drive, and scissor lift that also was not entirely operational. We did emerge successful </a:t>
+            </a:r>
+            <a:r>
+              <a:rPr lang="en-US" sz="2200" dirty="0" smtClean="0"/>
+              <a:t>at </a:t>
+            </a:r>
+            <a:r>
+              <a:rPr lang="en-US" sz="2200" dirty="0" smtClean="0"/>
+              <a:t>the end of the Qualifier, due to strategic driving in </a:t>
+            </a:r>
+            <a:r>
+              <a:rPr lang="en-US" sz="2200" dirty="0" smtClean="0"/>
+              <a:t>tele-op.</a:t>
             </a:r>
             <a:endParaRPr lang="en-US" sz="2200" dirty="0"/>
           </a:p>
@@ -11928,9 +11948,110 @@
           </a:fontRef>
         </p:style>
       </p:cxnSp>
+      <p:sp>
+        <p:nvSpPr>
+          <p:cNvPr id="13" name="TextBox 12"/>
+          <p:cNvSpPr txBox="1"/>
+          <p:nvPr/>
+        </p:nvSpPr>
+        <p:spPr>
+          <a:xfrm>
+            <a:off x="304800" y="709678"/>
+            <a:ext cx="5867401" cy="3416320"/>
+          </a:xfrm>
+          <a:prstGeom prst="rect">
+            <a:avLst/>
+          </a:prstGeom>
+          <a:noFill/>
+        </p:spPr>
+        <p:txBody>
+          <a:bodyPr wrap="square" rtlCol="0">
+            <a:spAutoFit/>
+          </a:bodyPr>
+          <a:lstStyle/>
+          <a:p>
+            <a:r>
+              <a:rPr lang="en-US" dirty="0" smtClean="0"/>
+              <a:t>What we decided we needed to work on after this Qualifier:</a:t>
+            </a:r>
+          </a:p>
+          <a:p>
+            <a:endParaRPr lang="en-US" dirty="0"/>
+          </a:p>
+          <a:p>
+            <a:pPr marL="342900" indent="-342900">
+              <a:buAutoNum type="arabicParenR"/>
+            </a:pPr>
+            <a:r>
+              <a:rPr lang="en-US" dirty="0" smtClean="0"/>
+              <a:t>We have to add another motor to the scissor lift in order to give it enough power to raise up and down in order to score in all the rolling goals and the 120 cm. goal.</a:t>
+            </a:r>
+          </a:p>
+          <a:p>
+            <a:pPr marL="342900" indent="-342900">
+              <a:buAutoNum type="arabicParenR"/>
+            </a:pPr>
+            <a:r>
+              <a:rPr lang="en-US" dirty="0" smtClean="0"/>
+              <a:t>We have to change the servos in the swerve drive pods to MG’s so that they will be strong enough to hold the wheel in position, making our swerve drive mechanism possible. </a:t>
+            </a:r>
+          </a:p>
+          <a:p>
+            <a:pPr marL="342900" indent="-342900">
+              <a:buAutoNum type="arabicParenR"/>
+            </a:pPr>
+            <a:r>
+              <a:rPr lang="en-US" dirty="0" smtClean="0"/>
+              <a:t>We need to work on our tele-op and color sensor autonomous codes, as well as a swerve-drive code.</a:t>
+            </a:r>
+          </a:p>
+          <a:p>
+            <a:endParaRPr lang="en-US" dirty="0"/>
+          </a:p>
+        </p:txBody>
+      </p:sp>
+      <p:sp>
+        <p:nvSpPr>
+          <p:cNvPr id="6" name="AutoShape 2" descr="Displaying 20150103_152326.jpg"/>
+          <p:cNvSpPr>
+            <a:spLocks noChangeAspect="1" noChangeArrowheads="1"/>
+          </p:cNvSpPr>
+          <p:nvPr/>
+        </p:nvSpPr>
+        <p:spPr bwMode="auto">
+          <a:xfrm>
+            <a:off x="155575" y="-144463"/>
+            <a:ext cx="304800" cy="304801"/>
+          </a:xfrm>
+          <a:prstGeom prst="rect">
+            <a:avLst/>
+          </a:prstGeom>
+          <a:noFill/>
+          <a:extLst>
+            <a:ext uri="{909E8E84-426E-40DD-AFC4-6F175D3DCCD1}">
+              <a14:hiddenFill xmlns:a14="http://schemas.microsoft.com/office/drawing/2010/main">
+                <a:solidFill>
+                  <a:srgbClr val="FFFFFF"/>
+                </a:solidFill>
+              </a14:hiddenFill>
+            </a:ext>
+          </a:extLst>
+        </p:spPr>
+        <p:txBody>
+          <a:bodyPr vert="horz" wrap="square" lIns="91440" tIns="45720" rIns="91440" bIns="45720" numCol="1" anchor="t" anchorCtr="0" compatLnSpc="1">
+            <a:prstTxWarp prst="textNoShape">
+              <a:avLst/>
+            </a:prstTxWarp>
+          </a:bodyPr>
+          <a:lstStyle/>
+          <a:p>
+            <a:endParaRPr lang="en-US"/>
+          </a:p>
+        </p:txBody>
+      </p:sp>
       <p:pic>
         <p:nvPicPr>
-          <p:cNvPr id="2" name="Picture 1"/>
+          <p:cNvPr id="7" name="Picture 6"/>
           <p:cNvPicPr>
             <a:picLocks noChangeAspect="1"/>
           </p:cNvPicPr>
@@ -11950,106 +12071,14 @@
         </p:blipFill>
         <p:spPr>
           <a:xfrm>
-            <a:off x="367496" y="4037548"/>
-            <a:ext cx="2420750" cy="4298731"/>
+            <a:off x="375031" y="3938110"/>
+            <a:ext cx="6083682" cy="4562762"/>
           </a:xfrm>
           <a:prstGeom prst="rect">
             <a:avLst/>
           </a:prstGeom>
         </p:spPr>
       </p:pic>
-      <p:pic>
-        <p:nvPicPr>
-          <p:cNvPr id="3" name="Picture 2"/>
-          <p:cNvPicPr>
-            <a:picLocks noChangeAspect="1"/>
-          </p:cNvPicPr>
-          <p:nvPr/>
-        </p:nvPicPr>
-        <p:blipFill>
-          <a:blip r:embed="rId4" cstate="print">
-            <a:extLst>
-              <a:ext uri="{28A0092B-C50C-407E-A947-70E740481C1C}">
-                <a14:useLocalDpi xmlns:a14="http://schemas.microsoft.com/office/drawing/2010/main" val="0"/>
-              </a:ext>
-            </a:extLst>
-          </a:blip>
-          <a:stretch>
-            <a:fillRect/>
-          </a:stretch>
-        </p:blipFill>
-        <p:spPr>
-          <a:xfrm>
-            <a:off x="2898647" y="5064116"/>
-            <a:ext cx="3764955" cy="2117787"/>
-          </a:xfrm>
-          <a:prstGeom prst="rect">
-            <a:avLst/>
-          </a:prstGeom>
-        </p:spPr>
-      </p:pic>
-      <p:sp>
-        <p:nvSpPr>
-          <p:cNvPr id="13" name="TextBox 12"/>
-          <p:cNvSpPr txBox="1"/>
-          <p:nvPr/>
-        </p:nvSpPr>
-        <p:spPr>
-          <a:xfrm>
-            <a:off x="304800" y="709678"/>
-            <a:ext cx="5867401" cy="3416320"/>
-          </a:xfrm>
-          <a:prstGeom prst="rect">
-            <a:avLst/>
-          </a:prstGeom>
-          <a:noFill/>
-        </p:spPr>
-        <p:txBody>
-          <a:bodyPr wrap="square" rtlCol="0">
-            <a:spAutoFit/>
-          </a:bodyPr>
-          <a:lstStyle/>
-          <a:p>
-            <a:r>
-              <a:rPr lang="en-US" dirty="0" smtClean="0"/>
-              <a:t>What we decided we needed to work on after this Qualifier:</a:t>
-            </a:r>
-          </a:p>
-          <a:p>
-            <a:endParaRPr lang="en-US" dirty="0"/>
-          </a:p>
-          <a:p>
-            <a:pPr marL="342900" indent="-342900">
-              <a:buAutoNum type="arabicParenR"/>
-            </a:pPr>
-            <a:r>
-              <a:rPr lang="en-US" dirty="0" smtClean="0"/>
-              <a:t>We have to add another motor to the scissor lift in order to give it enough power to raise up and down in order to score in all the rolling goals and the 120 cm. goal.</a:t>
-            </a:r>
-          </a:p>
-          <a:p>
-            <a:pPr marL="342900" indent="-342900">
-              <a:buAutoNum type="arabicParenR"/>
-            </a:pPr>
-            <a:r>
-              <a:rPr lang="en-US" dirty="0" smtClean="0"/>
-              <a:t>We have to change the servos in the swerve drive pods to MG’s so that they will be strong enough to hold the wheel in position, making our swerve drive mechanism possible. </a:t>
-            </a:r>
-          </a:p>
-          <a:p>
-            <a:pPr marL="342900" indent="-342900">
-              <a:buAutoNum type="arabicParenR"/>
-            </a:pPr>
-            <a:r>
-              <a:rPr lang="en-US" dirty="0" smtClean="0"/>
-              <a:t>We need to work on our tele-op and color sensor autonomous codes, as well as a swerve-drive code.</a:t>
-            </a:r>
-          </a:p>
-          <a:p>
-            <a:endParaRPr lang="en-US" dirty="0"/>
-          </a:p>
-        </p:txBody>
-      </p:sp>
     </p:spTree>
     <p:extLst>
       <p:ext uri="{BB962C8B-B14F-4D97-AF65-F5344CB8AC3E}">

</xml_diff>

<commit_message>
Teleop - Fixed elevator
WITH Buttons
</commit_message>
<xml_diff>
--- a/7350 nj qualifier entry.pptx
+++ b/7350 nj qualifier entry.pptx
@@ -7813,27 +7813,7 @@
             </a:r>
             <a:r>
               <a:rPr lang="en-US" sz="2200" dirty="0" smtClean="0"/>
-              <a:t>, 2015, our team competed in a New Jersey Qualifier at Liberty Science Center. We used our newly made robot that included a  carbon-fiber chasse, </a:t>
-            </a:r>
-            <a:r>
-              <a:rPr lang="en-US" sz="2200" dirty="0" smtClean="0"/>
-              <a:t>a </a:t>
-            </a:r>
-            <a:r>
-              <a:rPr lang="en-US" sz="2200" dirty="0" smtClean="0"/>
-              <a:t>swerve-drive, and scissor lift that also was not entirely operational. We did emerge successful </a:t>
-            </a:r>
-            <a:r>
-              <a:rPr lang="en-US" sz="2200" dirty="0" smtClean="0"/>
-              <a:t>at </a:t>
-            </a:r>
-            <a:r>
-              <a:rPr lang="en-US" sz="2200" dirty="0" smtClean="0"/>
-              <a:t>the end of the Qualifier, due to strategic driving in </a:t>
-            </a:r>
-            <a:r>
-              <a:rPr lang="en-US" sz="2200" dirty="0" smtClean="0"/>
-              <a:t>tele-op.</a:t>
+              <a:t>, 2015, our team competed in a New Jersey Qualifier at Liberty Science Center. We used our newly made robot that included a  carbon-fiber chasse, a swerve-drive, and scissor lift that also was not entirely operational. We did emerge successful at the end of the Qualifier, due to strategic driving in tele-op.</a:t>
             </a:r>
             <a:endParaRPr lang="en-US" sz="2200" dirty="0"/>
           </a:p>

</xml_diff>